<commit_message>
review 2 ppt edit
</commit_message>
<xml_diff>
--- a/presentations/Review 2.pptx
+++ b/presentations/Review 2.pptx
@@ -4320,20 +4320,6 @@
           <a:p>
             <a:pPr lvl="1"/>
             <a:r>
-              <a:rPr lang="en-US" dirty="0"/>
-              <a:t>Matplotlib – plotting library </a:t>
-            </a:r>
-          </a:p>
-          <a:p>
-            <a:pPr lvl="1"/>
-            <a:r>
-              <a:rPr lang="en-US" dirty="0"/>
-              <a:t>Seaborn – visualization library based on matplotlib</a:t>
-            </a:r>
-          </a:p>
-          <a:p>
-            <a:pPr lvl="1"/>
-            <a:r>
               <a:rPr lang="en-US" dirty="0" err="1"/>
               <a:t>Ploty</a:t>
             </a:r>
@@ -4341,6 +4327,18 @@
               <a:rPr lang="en-US" dirty="0"/>
               <a:t> – plot 2d data and color scaling functionality </a:t>
             </a:r>
+          </a:p>
+          <a:p>
+            <a:pPr lvl="1"/>
+            <a:r>
+              <a:rPr lang="en-US" dirty="0"/>
+              <a:t>Flask  - </a:t>
+            </a:r>
+            <a:r>
+              <a:rPr lang="en-US"/>
+              <a:t>website hosting </a:t>
+            </a:r>
+            <a:endParaRPr lang="en-US" dirty="0"/>
           </a:p>
         </p:txBody>
       </p:sp>
@@ -4556,11 +4554,11 @@
             </a:pPr>
             <a:r>
               <a:rPr lang="en-US" dirty="0"/>
-              <a:t>Project will be implemented using seaborn, matplot.lib, </a:t>
-            </a:r>
-            <a:r>
-              <a:rPr lang="en-US" dirty="0" err="1"/>
-              <a:t>ploty</a:t>
+              <a:t>Project will be implemented using </a:t>
+            </a:r>
+            <a:r>
+              <a:rPr lang="en-US"/>
+              <a:t>pandas,ploty</a:t>
             </a:r>
             <a:r>
               <a:rPr lang="en-US" dirty="0"/>

</xml_diff>